<commit_message>
small change to poster
</commit_message>
<xml_diff>
--- a/UGS_FYP_Poster_CS7239.pptx
+++ b/UGS_FYP_Poster_CS7239.pptx
@@ -373,7 +373,7 @@
           <a:noFill/>
           <a:extLst>
             <a:ext uri="{909E8E84-426E-40dd-AFC4-6F175D3DCCD1}">
-              <a14:hiddenFill xmlns:a14="http://schemas.microsoft.com/office/drawing/2010/main" xmlns="">
+              <a14:hiddenFill xmlns="" xmlns:a14="http://schemas.microsoft.com/office/drawing/2010/main">
                 <a:solidFill>
                   <a:srgbClr val="FFFFFF"/>
                 </a:solidFill>
@@ -420,7 +420,7 @@
           <a:noFill/>
           <a:extLst>
             <a:ext uri="{909E8E84-426E-40dd-AFC4-6F175D3DCCD1}">
-              <a14:hiddenFill xmlns:a14="http://schemas.microsoft.com/office/drawing/2010/main" xmlns="">
+              <a14:hiddenFill xmlns="" xmlns:a14="http://schemas.microsoft.com/office/drawing/2010/main">
                 <a:solidFill>
                   <a:srgbClr val="FFFFFF"/>
                 </a:solidFill>
@@ -1090,7 +1090,7 @@
         <p:spPr>
           <a:xfrm>
             <a:off x="0" y="2026980"/>
-            <a:ext cx="21386800" cy="1938992"/>
+            <a:ext cx="21386800" cy="1015663"/>
           </a:xfrm>
           <a:prstGeom prst="rect">
             <a:avLst/>
@@ -1113,18 +1113,7 @@
                   <a:srgbClr val="00306C"/>
                 </a:solidFill>
               </a:rPr>
-              <a:t>Hybrid Localization with Video Based Positioning </a:t>
-            </a:r>
-          </a:p>
-          <a:p>
-            <a:pPr algn="ctr"/>
-            <a:r>
-              <a:rPr lang="en-GB" sz="6000" b="1" dirty="0">
-                <a:solidFill>
-                  <a:srgbClr val="00306C"/>
-                </a:solidFill>
-              </a:rPr>
-              <a:t>Technology</a:t>
+              <a:t>Hybrid Localization with Video Based Positioning Technology</a:t>
             </a:r>
           </a:p>
         </p:txBody>
@@ -1143,8 +1132,8 @@
         </p:nvSpPr>
         <p:spPr>
           <a:xfrm>
-            <a:off x="0" y="3052331"/>
-            <a:ext cx="13933760" cy="5766872"/>
+            <a:off x="0" y="2864488"/>
+            <a:ext cx="13933760" cy="6228537"/>
           </a:xfrm>
           <a:prstGeom prst="rect">
             <a:avLst/>
@@ -1155,7 +1144,7 @@
           </a:ln>
           <a:extLst>
             <a:ext uri="{C572A759-6A51-4108-AA02-DFA0A04FC94B}">
-              <ma14:wrappingTextBoxFlag xmlns="" xmlns:ma14="http://schemas.microsoft.com/office/mac/drawingml/2011/main" val="1"/>
+              <ma14:wrappingTextBoxFlag xmlns:ma14="http://schemas.microsoft.com/office/mac/drawingml/2011/main" xmlns="" val="1"/>
             </a:ext>
           </a:extLst>
         </p:spPr>
@@ -1259,7 +1248,7 @@
                 <a:cs typeface="CMU Sans Serif"/>
                 <a:sym typeface="CMU Sans Serif"/>
               </a:rPr>
-              <a:t>This proposed solution provides for an infrastructure-less and low cost solution in the indoor localization field by applying pedestrian dead reckoning using the smartphone’s sensors and camera to track the user’s location as well as to scan the QR Code.</a:t>
+              <a:t>This proposed solution provides for an infrastructure-less and low cost solution in the indoor localization field by applying pedestrian dead reckoning using the smartphone’s sensors and camera to track the user’s location as well as to scan the QR Code as well as a stationary accelerometer prompt to allow users to reset the accelerometer.</a:t>
             </a:r>
           </a:p>
         </p:txBody>
@@ -1356,7 +1345,7 @@
         </p:nvSpPr>
         <p:spPr>
           <a:xfrm>
-            <a:off x="13933760" y="3051674"/>
+            <a:off x="13933760" y="2864488"/>
             <a:ext cx="7449906" cy="4651182"/>
           </a:xfrm>
           <a:prstGeom prst="rect">
@@ -1368,7 +1357,7 @@
           </a:ln>
           <a:extLst>
             <a:ext uri="{C572A759-6A51-4108-AA02-DFA0A04FC94B}">
-              <ma14:wrappingTextBoxFlag xmlns="" xmlns:ma14="http://schemas.microsoft.com/office/mac/drawingml/2011/main" val="1"/>
+              <ma14:wrappingTextBoxFlag xmlns:ma14="http://schemas.microsoft.com/office/mac/drawingml/2011/main" xmlns="" val="1"/>
             </a:ext>
           </a:extLst>
         </p:spPr>
@@ -1556,7 +1545,7 @@
         </p:nvSpPr>
         <p:spPr>
           <a:xfrm>
-            <a:off x="0" y="8317985"/>
+            <a:off x="0" y="8714402"/>
             <a:ext cx="7312159" cy="1342584"/>
           </a:xfrm>
           <a:prstGeom prst="rect">
@@ -1568,7 +1557,7 @@
           </a:ln>
           <a:extLst>
             <a:ext uri="{C572A759-6A51-4108-AA02-DFA0A04FC94B}">
-              <ma14:wrappingTextBoxFlag xmlns="" xmlns:ma14="http://schemas.microsoft.com/office/mac/drawingml/2011/main" val="1"/>
+              <ma14:wrappingTextBoxFlag xmlns:ma14="http://schemas.microsoft.com/office/mac/drawingml/2011/main" xmlns="" val="1"/>
             </a:ext>
           </a:extLst>
         </p:spPr>
@@ -1616,7 +1605,7 @@
         </p:nvSpPr>
         <p:spPr>
           <a:xfrm>
-            <a:off x="1751580" y="12961184"/>
+            <a:off x="1751580" y="13267758"/>
             <a:ext cx="5654818" cy="400110"/>
           </a:xfrm>
           <a:prstGeom prst="rect">
@@ -1651,7 +1640,7 @@
         </p:nvSpPr>
         <p:spPr>
           <a:xfrm>
-            <a:off x="9638969" y="7962407"/>
+            <a:off x="9663146" y="8151842"/>
             <a:ext cx="11752086" cy="6254185"/>
           </a:xfrm>
           <a:prstGeom prst="rect">
@@ -1663,7 +1652,7 @@
           </a:ln>
           <a:extLst>
             <a:ext uri="{C572A759-6A51-4108-AA02-DFA0A04FC94B}">
-              <ma14:wrappingTextBoxFlag xmlns="" xmlns:ma14="http://schemas.microsoft.com/office/mac/drawingml/2011/main" val="1"/>
+              <ma14:wrappingTextBoxFlag xmlns:ma14="http://schemas.microsoft.com/office/mac/drawingml/2011/main" xmlns="" val="1"/>
             </a:ext>
           </a:extLst>
         </p:spPr>
@@ -1844,7 +1833,7 @@
           </a:ln>
           <a:extLst>
             <a:ext uri="{C572A759-6A51-4108-AA02-DFA0A04FC94B}">
-              <ma14:wrappingTextBoxFlag xmlns="" xmlns:ma14="http://schemas.microsoft.com/office/mac/drawingml/2011/main" val="1"/>
+              <ma14:wrappingTextBoxFlag xmlns:ma14="http://schemas.microsoft.com/office/mac/drawingml/2011/main" xmlns="" val="1"/>
             </a:ext>
           </a:extLst>
         </p:spPr>
@@ -2710,7 +2699,7 @@
           </a:ln>
           <a:extLst>
             <a:ext uri="{C572A759-6A51-4108-AA02-DFA0A04FC94B}">
-              <ma14:wrappingTextBoxFlag xmlns="" xmlns:ma14="http://schemas.microsoft.com/office/mac/drawingml/2011/main" val="1"/>
+              <ma14:wrappingTextBoxFlag xmlns:ma14="http://schemas.microsoft.com/office/mac/drawingml/2011/main" xmlns="" val="1"/>
             </a:ext>
           </a:extLst>
         </p:spPr>
@@ -3038,7 +3027,7 @@
           </a:ln>
           <a:extLst>
             <a:ext uri="{C572A759-6A51-4108-AA02-DFA0A04FC94B}">
-              <ma14:wrappingTextBoxFlag xmlns="" xmlns:ma14="http://schemas.microsoft.com/office/mac/drawingml/2011/main" val="1"/>
+              <ma14:wrappingTextBoxFlag xmlns:ma14="http://schemas.microsoft.com/office/mac/drawingml/2011/main" xmlns="" val="1"/>
             </a:ext>
           </a:extLst>
         </p:spPr>
@@ -3382,7 +3371,7 @@
           </a:ln>
           <a:extLst>
             <a:ext uri="{C572A759-6A51-4108-AA02-DFA0A04FC94B}">
-              <ma14:wrappingTextBoxFlag xmlns="" xmlns:ma14="http://schemas.microsoft.com/office/mac/drawingml/2011/main" val="1"/>
+              <ma14:wrappingTextBoxFlag xmlns:ma14="http://schemas.microsoft.com/office/mac/drawingml/2011/main" xmlns="" val="1"/>
             </a:ext>
           </a:extLst>
         </p:spPr>
@@ -3613,7 +3602,7 @@
           </a:ln>
           <a:extLst>
             <a:ext uri="{C572A759-6A51-4108-AA02-DFA0A04FC94B}">
-              <ma14:wrappingTextBoxFlag xmlns="" xmlns:ma14="http://schemas.microsoft.com/office/mac/drawingml/2011/main" val="1"/>
+              <ma14:wrappingTextBoxFlag xmlns:ma14="http://schemas.microsoft.com/office/mac/drawingml/2011/main" xmlns="" val="1"/>
             </a:ext>
           </a:extLst>
         </p:spPr>
@@ -3783,7 +3772,7 @@
         </p:blipFill>
         <p:spPr>
           <a:xfrm>
-            <a:off x="252241" y="9323976"/>
+            <a:off x="252241" y="9630550"/>
             <a:ext cx="9419096" cy="3120930"/>
           </a:xfrm>
           <a:prstGeom prst="rect">

</xml_diff>